<commit_message>
Setup report and complete abstract
</commit_message>
<xml_diff>
--- a/treewidth_presentation.pptx
+++ b/treewidth_presentation.pptx
@@ -183,7 +183,6 @@
           </a:p>
         </c:rich>
       </c:tx>
-      <c:layout/>
       <c:overlay val="0"/>
       <c:spPr>
         <a:noFill/>
@@ -382,11 +381,11 @@
           <c:showPercent val="0"/>
           <c:showBubbleSize val="0"/>
         </c:dLbls>
-        <c:axId val="-1066308832"/>
-        <c:axId val="-1066311008"/>
+        <c:axId val="1019483584"/>
+        <c:axId val="1019492288"/>
       </c:scatterChart>
       <c:valAx>
-        <c:axId val="-1066308832"/>
+        <c:axId val="1019483584"/>
         <c:scaling>
           <c:orientation val="minMax"/>
         </c:scaling>
@@ -438,7 +437,6 @@
               </a:p>
             </c:rich>
           </c:tx>
-          <c:layout/>
           <c:overlay val="0"/>
           <c:spPr>
             <a:noFill/>
@@ -505,12 +503,12 @@
             <a:endParaRPr lang="en-US"/>
           </a:p>
         </c:txPr>
-        <c:crossAx val="-1066311008"/>
+        <c:crossAx val="1019492288"/>
         <c:crosses val="autoZero"/>
         <c:crossBetween val="midCat"/>
       </c:valAx>
       <c:valAx>
-        <c:axId val="-1066311008"/>
+        <c:axId val="1019492288"/>
         <c:scaling>
           <c:orientation val="minMax"/>
         </c:scaling>
@@ -556,7 +554,6 @@
               </a:p>
             </c:rich>
           </c:tx>
-          <c:layout/>
           <c:overlay val="0"/>
           <c:spPr>
             <a:noFill/>
@@ -623,7 +620,7 @@
             <a:endParaRPr lang="en-US"/>
           </a:p>
         </c:txPr>
-        <c:crossAx val="-1066308832"/>
+        <c:crossAx val="1019483584"/>
         <c:crosses val="autoZero"/>
         <c:crossBetween val="midCat"/>
       </c:valAx>

</xml_diff>

<commit_message>
Setup report and draft abstract+intro
</commit_message>
<xml_diff>
--- a/treewidth_presentation.pptx
+++ b/treewidth_presentation.pptx
@@ -381,11 +381,11 @@
           <c:showPercent val="0"/>
           <c:showBubbleSize val="0"/>
         </c:dLbls>
-        <c:axId val="1019483584"/>
-        <c:axId val="1019492288"/>
+        <c:axId val="1356049056"/>
+        <c:axId val="1356045248"/>
       </c:scatterChart>
       <c:valAx>
-        <c:axId val="1019483584"/>
+        <c:axId val="1356049056"/>
         <c:scaling>
           <c:orientation val="minMax"/>
         </c:scaling>
@@ -503,12 +503,12 @@
             <a:endParaRPr lang="en-US"/>
           </a:p>
         </c:txPr>
-        <c:crossAx val="1019492288"/>
+        <c:crossAx val="1356045248"/>
         <c:crosses val="autoZero"/>
         <c:crossBetween val="midCat"/>
       </c:valAx>
       <c:valAx>
-        <c:axId val="1019492288"/>
+        <c:axId val="1356045248"/>
         <c:scaling>
           <c:orientation val="minMax"/>
         </c:scaling>
@@ -620,7 +620,7 @@
             <a:endParaRPr lang="en-US"/>
           </a:p>
         </c:txPr>
-        <c:crossAx val="1019483584"/>
+        <c:crossAx val="1356049056"/>
         <c:crosses val="autoZero"/>
         <c:crossBetween val="midCat"/>
       </c:valAx>
@@ -1346,7 +1346,7 @@
           <a:p>
             <a:fld id="{10D00C45-4342-4A68-9A0F-1973E79D2689}" type="datetimeFigureOut">
               <a:rPr lang="en-CA" smtClean="0"/>
-              <a:t>2018-03-29</a:t>
+              <a:t>2018-03-30</a:t>
             </a:fld>
             <a:endParaRPr lang="en-CA"/>
           </a:p>
@@ -1516,7 +1516,7 @@
           <a:p>
             <a:fld id="{10D00C45-4342-4A68-9A0F-1973E79D2689}" type="datetimeFigureOut">
               <a:rPr lang="en-CA" smtClean="0"/>
-              <a:t>2018-03-29</a:t>
+              <a:t>2018-03-30</a:t>
             </a:fld>
             <a:endParaRPr lang="en-CA"/>
           </a:p>
@@ -1696,7 +1696,7 @@
           <a:p>
             <a:fld id="{10D00C45-4342-4A68-9A0F-1973E79D2689}" type="datetimeFigureOut">
               <a:rPr lang="en-CA" smtClean="0"/>
-              <a:t>2018-03-29</a:t>
+              <a:t>2018-03-30</a:t>
             </a:fld>
             <a:endParaRPr lang="en-CA"/>
           </a:p>
@@ -1866,7 +1866,7 @@
           <a:p>
             <a:fld id="{10D00C45-4342-4A68-9A0F-1973E79D2689}" type="datetimeFigureOut">
               <a:rPr lang="en-CA" smtClean="0"/>
-              <a:t>2018-03-29</a:t>
+              <a:t>2018-03-30</a:t>
             </a:fld>
             <a:endParaRPr lang="en-CA"/>
           </a:p>
@@ -2112,7 +2112,7 @@
           <a:p>
             <a:fld id="{10D00C45-4342-4A68-9A0F-1973E79D2689}" type="datetimeFigureOut">
               <a:rPr lang="en-CA" smtClean="0"/>
-              <a:t>2018-03-29</a:t>
+              <a:t>2018-03-30</a:t>
             </a:fld>
             <a:endParaRPr lang="en-CA"/>
           </a:p>
@@ -2344,7 +2344,7 @@
           <a:p>
             <a:fld id="{10D00C45-4342-4A68-9A0F-1973E79D2689}" type="datetimeFigureOut">
               <a:rPr lang="en-CA" smtClean="0"/>
-              <a:t>2018-03-29</a:t>
+              <a:t>2018-03-30</a:t>
             </a:fld>
             <a:endParaRPr lang="en-CA"/>
           </a:p>
@@ -2711,7 +2711,7 @@
           <a:p>
             <a:fld id="{10D00C45-4342-4A68-9A0F-1973E79D2689}" type="datetimeFigureOut">
               <a:rPr lang="en-CA" smtClean="0"/>
-              <a:t>2018-03-29</a:t>
+              <a:t>2018-03-30</a:t>
             </a:fld>
             <a:endParaRPr lang="en-CA"/>
           </a:p>
@@ -2829,7 +2829,7 @@
           <a:p>
             <a:fld id="{10D00C45-4342-4A68-9A0F-1973E79D2689}" type="datetimeFigureOut">
               <a:rPr lang="en-CA" smtClean="0"/>
-              <a:t>2018-03-29</a:t>
+              <a:t>2018-03-30</a:t>
             </a:fld>
             <a:endParaRPr lang="en-CA"/>
           </a:p>
@@ -2924,7 +2924,7 @@
           <a:p>
             <a:fld id="{10D00C45-4342-4A68-9A0F-1973E79D2689}" type="datetimeFigureOut">
               <a:rPr lang="en-CA" smtClean="0"/>
-              <a:t>2018-03-29</a:t>
+              <a:t>2018-03-30</a:t>
             </a:fld>
             <a:endParaRPr lang="en-CA"/>
           </a:p>
@@ -3201,7 +3201,7 @@
           <a:p>
             <a:fld id="{10D00C45-4342-4A68-9A0F-1973E79D2689}" type="datetimeFigureOut">
               <a:rPr lang="en-CA" smtClean="0"/>
-              <a:t>2018-03-29</a:t>
+              <a:t>2018-03-30</a:t>
             </a:fld>
             <a:endParaRPr lang="en-CA"/>
           </a:p>
@@ -3454,7 +3454,7 @@
           <a:p>
             <a:fld id="{10D00C45-4342-4A68-9A0F-1973E79D2689}" type="datetimeFigureOut">
               <a:rPr lang="en-CA" smtClean="0"/>
-              <a:t>2018-03-29</a:t>
+              <a:t>2018-03-30</a:t>
             </a:fld>
             <a:endParaRPr lang="en-CA"/>
           </a:p>
@@ -3667,7 +3667,7 @@
           <a:p>
             <a:fld id="{10D00C45-4342-4A68-9A0F-1973E79D2689}" type="datetimeFigureOut">
               <a:rPr lang="en-CA" smtClean="0"/>
-              <a:t>2018-03-29</a:t>
+              <a:t>2018-03-30</a:t>
             </a:fld>
             <a:endParaRPr lang="en-CA"/>
           </a:p>
@@ -10800,8 +10800,23 @@
               <a:rPr lang="en-CA" dirty="0" smtClean="0">
                 <a:latin typeface="Gill Sans MT" panose="020B0502020104020203" pitchFamily="34" charset="0"/>
               </a:rPr>
-              <a:t> has Treewidth N</a:t>
-            </a:r>
+              <a:t> has </a:t>
+            </a:r>
+            <a:r>
+              <a:rPr lang="en-CA" smtClean="0">
+                <a:latin typeface="Gill Sans MT" panose="020B0502020104020203" pitchFamily="34" charset="0"/>
+              </a:rPr>
+              <a:t>Treewidth </a:t>
+            </a:r>
+            <a:r>
+              <a:rPr lang="en-CA" smtClean="0">
+                <a:latin typeface="Gill Sans MT" panose="020B0502020104020203" pitchFamily="34" charset="0"/>
+              </a:rPr>
+              <a:t>N-1</a:t>
+            </a:r>
+            <a:endParaRPr lang="en-CA" dirty="0" smtClean="0">
+              <a:latin typeface="Gill Sans MT" panose="020B0502020104020203" pitchFamily="34" charset="0"/>
+            </a:endParaRPr>
           </a:p>
           <a:p>
             <a:r>

</xml_diff>